<commit_message>
changed instructions a bit
</commit_message>
<xml_diff>
--- a/RestaurantGame/Images/Other/Instructions.pptx
+++ b/RestaurantGame/Images/Other/Instructions.pptx
@@ -290,7 +290,7 @@
             <a:fld id="{348FD64A-658E-4CC7-B5AC-3AEC09433BA8}" type="datetimeFigureOut">
               <a:rPr lang="en-US" smtClean="0"/>
               <a:pPr/>
-              <a:t>10/16/2016</a:t>
+              <a:t>10/18/2016</a:t>
             </a:fld>
             <a:endParaRPr lang="en-US"/>
           </a:p>
@@ -457,7 +457,7 @@
             <a:fld id="{348FD64A-658E-4CC7-B5AC-3AEC09433BA8}" type="datetimeFigureOut">
               <a:rPr lang="en-US" smtClean="0"/>
               <a:pPr/>
-              <a:t>10/16/2016</a:t>
+              <a:t>10/18/2016</a:t>
             </a:fld>
             <a:endParaRPr lang="en-US"/>
           </a:p>
@@ -634,7 +634,7 @@
             <a:fld id="{348FD64A-658E-4CC7-B5AC-3AEC09433BA8}" type="datetimeFigureOut">
               <a:rPr lang="en-US" smtClean="0"/>
               <a:pPr/>
-              <a:t>10/16/2016</a:t>
+              <a:t>10/18/2016</a:t>
             </a:fld>
             <a:endParaRPr lang="en-US"/>
           </a:p>
@@ -801,7 +801,7 @@
             <a:fld id="{348FD64A-658E-4CC7-B5AC-3AEC09433BA8}" type="datetimeFigureOut">
               <a:rPr lang="en-US" smtClean="0"/>
               <a:pPr/>
-              <a:t>10/16/2016</a:t>
+              <a:t>10/18/2016</a:t>
             </a:fld>
             <a:endParaRPr lang="en-US"/>
           </a:p>
@@ -1044,7 +1044,7 @@
             <a:fld id="{348FD64A-658E-4CC7-B5AC-3AEC09433BA8}" type="datetimeFigureOut">
               <a:rPr lang="en-US" smtClean="0"/>
               <a:pPr/>
-              <a:t>10/16/2016</a:t>
+              <a:t>10/18/2016</a:t>
             </a:fld>
             <a:endParaRPr lang="en-US"/>
           </a:p>
@@ -1329,7 +1329,7 @@
             <a:fld id="{348FD64A-658E-4CC7-B5AC-3AEC09433BA8}" type="datetimeFigureOut">
               <a:rPr lang="en-US" smtClean="0"/>
               <a:pPr/>
-              <a:t>10/16/2016</a:t>
+              <a:t>10/18/2016</a:t>
             </a:fld>
             <a:endParaRPr lang="en-US"/>
           </a:p>
@@ -1748,7 +1748,7 @@
             <a:fld id="{348FD64A-658E-4CC7-B5AC-3AEC09433BA8}" type="datetimeFigureOut">
               <a:rPr lang="en-US" smtClean="0"/>
               <a:pPr/>
-              <a:t>10/16/2016</a:t>
+              <a:t>10/18/2016</a:t>
             </a:fld>
             <a:endParaRPr lang="en-US"/>
           </a:p>
@@ -1863,7 +1863,7 @@
             <a:fld id="{348FD64A-658E-4CC7-B5AC-3AEC09433BA8}" type="datetimeFigureOut">
               <a:rPr lang="en-US" smtClean="0"/>
               <a:pPr/>
-              <a:t>10/16/2016</a:t>
+              <a:t>10/18/2016</a:t>
             </a:fld>
             <a:endParaRPr lang="en-US"/>
           </a:p>
@@ -1955,7 +1955,7 @@
             <a:fld id="{348FD64A-658E-4CC7-B5AC-3AEC09433BA8}" type="datetimeFigureOut">
               <a:rPr lang="en-US" smtClean="0"/>
               <a:pPr/>
-              <a:t>10/16/2016</a:t>
+              <a:t>10/18/2016</a:t>
             </a:fld>
             <a:endParaRPr lang="en-US"/>
           </a:p>
@@ -2229,7 +2229,7 @@
             <a:fld id="{348FD64A-658E-4CC7-B5AC-3AEC09433BA8}" type="datetimeFigureOut">
               <a:rPr lang="en-US" smtClean="0"/>
               <a:pPr/>
-              <a:t>10/16/2016</a:t>
+              <a:t>10/18/2016</a:t>
             </a:fld>
             <a:endParaRPr lang="en-US"/>
           </a:p>
@@ -2479,7 +2479,7 @@
             <a:fld id="{348FD64A-658E-4CC7-B5AC-3AEC09433BA8}" type="datetimeFigureOut">
               <a:rPr lang="en-US" smtClean="0"/>
               <a:pPr/>
-              <a:t>10/16/2016</a:t>
+              <a:t>10/18/2016</a:t>
             </a:fld>
             <a:endParaRPr lang="en-US"/>
           </a:p>
@@ -2689,7 +2689,7 @@
             <a:fld id="{348FD64A-658E-4CC7-B5AC-3AEC09433BA8}" type="datetimeFigureOut">
               <a:rPr lang="en-US" smtClean="0"/>
               <a:pPr/>
-              <a:t>10/16/2016</a:t>
+              <a:t>10/18/2016</a:t>
             </a:fld>
             <a:endParaRPr lang="en-US"/>
           </a:p>
@@ -3204,7 +3204,7 @@
         </p:nvSpPr>
         <p:spPr>
           <a:xfrm>
-            <a:off x="2357422" y="4357694"/>
+            <a:off x="3000364" y="4214818"/>
             <a:ext cx="1857388" cy="928694"/>
           </a:xfrm>
           <a:prstGeom prst="wedgeRoundRectCallout">
@@ -3474,7 +3474,7 @@
         <p:spPr>
           <a:xfrm>
             <a:off x="0" y="4357694"/>
-            <a:ext cx="2428892" cy="857256"/>
+            <a:ext cx="2857488" cy="1000132"/>
           </a:xfrm>
           <a:prstGeom prst="wedgeRoundRectCallout">
             <a:avLst>
@@ -3505,7 +3505,11 @@
             <a:pPr algn="ctr"/>
             <a:r>
               <a:rPr lang="en-US" sz="1600" dirty="0" smtClean="0"/>
-              <a:t>The rankings of the hired candidates are saved in the positions list</a:t>
+              <a:t>The rankings of the hired candidates are saved in the positions </a:t>
+            </a:r>
+            <a:r>
+              <a:rPr lang="en-US" sz="1600" dirty="0" smtClean="0"/>
+              <a:t>list. </a:t>
             </a:r>
             <a:endParaRPr lang="en-US" sz="1600" dirty="0"/>
           </a:p>
@@ -4054,7 +4058,7 @@
         </p:nvSpPr>
         <p:spPr>
           <a:xfrm>
-            <a:off x="8715404" y="1928802"/>
+            <a:off x="7786710" y="1857364"/>
             <a:ext cx="3143272" cy="1357322"/>
           </a:xfrm>
           <a:prstGeom prst="roundRect">
@@ -4178,19 +4182,7 @@
             <a:pPr algn="ctr"/>
             <a:r>
               <a:rPr lang="en-US" sz="1600" dirty="0" smtClean="0"/>
-              <a:t>After a candidate is </a:t>
-            </a:r>
-            <a:r>
-              <a:rPr lang="en-US" sz="1600" dirty="0" smtClean="0"/>
-              <a:t>hired, </a:t>
-            </a:r>
-            <a:r>
-              <a:rPr lang="en-US" sz="1600" dirty="0" smtClean="0"/>
-              <a:t>you need to pick uniform for </a:t>
-            </a:r>
-            <a:r>
-              <a:rPr lang="en-US" sz="1600" dirty="0" smtClean="0"/>
-              <a:t>him. </a:t>
+              <a:t>After a candidate is hired, you need to pick uniform for him. </a:t>
             </a:r>
           </a:p>
           <a:p>
@@ -4199,7 +4191,6 @@
               <a:rPr lang="en-US" sz="1600" dirty="0" smtClean="0"/>
               <a:t>Then we move on to the next position</a:t>
             </a:r>
-            <a:endParaRPr lang="en-US" sz="1600" dirty="0" smtClean="0"/>
           </a:p>
           <a:p>
             <a:pPr algn="ctr"/>
@@ -4308,7 +4299,6 @@
               <a:rPr lang="en-US" sz="1600" dirty="0" smtClean="0"/>
               <a:t>For each position, you have 10 different candidates. Your (and the HR executive’s) interest is to hire highly qualified candidate.</a:t>
             </a:r>
-            <a:endParaRPr lang="en-US" sz="1600" dirty="0" smtClean="0"/>
           </a:p>
           <a:p>
             <a:pPr algn="ctr"/>
@@ -4358,9 +4348,8 @@
             <a:pPr algn="ctr"/>
             <a:r>
               <a:rPr lang="en-US" sz="1600" dirty="0" smtClean="0"/>
-              <a:t>The candidates are interviewed one by another by the HR executive, and each candidate has a rank, relative to all the previous candidates.</a:t>
-            </a:r>
-            <a:endParaRPr lang="en-US" sz="1600" dirty="0" smtClean="0"/>
+              <a:t>The candidates are interviewed one by one by the HR executive, and each candidate has a rank, relative to all the previous candidates.</a:t>
+            </a:r>
           </a:p>
           <a:p>
             <a:pPr algn="ctr"/>
@@ -4412,7 +4401,6 @@
               <a:rPr lang="en-US" sz="1600" dirty="0" smtClean="0"/>
               <a:t>As the HR executive interviews a new candidate, he needs to decide whether to hire him or not. Once a candidate has been rejected, he cannot be hired later (cannot be recalled).</a:t>
             </a:r>
-            <a:endParaRPr lang="en-US" sz="1600" dirty="0" smtClean="0"/>
           </a:p>
           <a:p>
             <a:pPr algn="ctr"/>
@@ -4553,6 +4541,57 @@
               <a:t>This is the current position we are interviewing candidates for.</a:t>
             </a:r>
             <a:endParaRPr lang="en-US" sz="1600" dirty="0"/>
+          </a:p>
+        </p:txBody>
+      </p:sp>
+      <p:sp>
+        <p:nvSpPr>
+          <p:cNvPr id="36" name="Rounded Rectangle 35"/>
+          <p:cNvSpPr/>
+          <p:nvPr/>
+        </p:nvSpPr>
+        <p:spPr>
+          <a:xfrm>
+            <a:off x="7939110" y="2009764"/>
+            <a:ext cx="2847996" cy="1062046"/>
+          </a:xfrm>
+          <a:prstGeom prst="roundRect">
+            <a:avLst>
+              <a:gd name="adj" fmla="val 33758"/>
+            </a:avLst>
+          </a:prstGeom>
+        </p:spPr>
+        <p:style>
+          <a:lnRef idx="1">
+            <a:schemeClr val="accent5"/>
+          </a:lnRef>
+          <a:fillRef idx="2">
+            <a:schemeClr val="accent5"/>
+          </a:fillRef>
+          <a:effectRef idx="1">
+            <a:schemeClr val="accent5"/>
+          </a:effectRef>
+          <a:fontRef idx="minor">
+            <a:schemeClr val="dk1"/>
+          </a:fontRef>
+        </p:style>
+        <p:txBody>
+          <a:bodyPr rtlCol="0" anchor="ctr"/>
+          <a:lstStyle/>
+          <a:p>
+            <a:pPr algn="ctr"/>
+            <a:r>
+              <a:rPr lang="en-US" sz="1600" dirty="0" smtClean="0"/>
+              <a:t>Filling a Position –</a:t>
+            </a:r>
+          </a:p>
+          <a:p>
+            <a:pPr algn="ctr"/>
+            <a:r>
+              <a:rPr lang="en-US" sz="1600" dirty="0" smtClean="0"/>
+              <a:t>Summary</a:t>
+            </a:r>
+            <a:endParaRPr lang="en-US" dirty="0"/>
           </a:p>
         </p:txBody>
       </p:sp>

</xml_diff>